<commit_message>
commiting the new changes
</commit_message>
<xml_diff>
--- a/Project_Presentation.pptx
+++ b/Project_Presentation.pptx
@@ -210,7 +210,7 @@
           <a:p>
             <a:fld id="{3DAB1702-74C0-4E1B-AE9D-32E742619B00}" type="datetimeFigureOut">
               <a:rPr lang="en-CA" smtClean="0"/>
-              <a:t>2019-11-20</a:t>
+              <a:t>2019-12-10</a:t>
             </a:fld>
             <a:endParaRPr lang="en-CA"/>
           </a:p>
@@ -748,7 +748,7 @@
           <a:p>
             <a:fld id="{FFA37F36-A11D-4F16-96EF-CEA0021B2F0A}" type="datetimeFigureOut">
               <a:rPr lang="en-CA" smtClean="0"/>
-              <a:t>2019-11-20</a:t>
+              <a:t>2019-12-10</a:t>
             </a:fld>
             <a:endParaRPr lang="en-CA"/>
           </a:p>
@@ -1023,7 +1023,7 @@
           <a:p>
             <a:fld id="{FFA37F36-A11D-4F16-96EF-CEA0021B2F0A}" type="datetimeFigureOut">
               <a:rPr lang="en-CA" smtClean="0"/>
-              <a:t>2019-11-20</a:t>
+              <a:t>2019-12-10</a:t>
             </a:fld>
             <a:endParaRPr lang="en-CA"/>
           </a:p>
@@ -1217,7 +1217,7 @@
           <a:p>
             <a:fld id="{FFA37F36-A11D-4F16-96EF-CEA0021B2F0A}" type="datetimeFigureOut">
               <a:rPr lang="en-CA" smtClean="0"/>
-              <a:t>2019-11-20</a:t>
+              <a:t>2019-12-10</a:t>
             </a:fld>
             <a:endParaRPr lang="en-CA"/>
           </a:p>
@@ -1490,7 +1490,7 @@
           <a:p>
             <a:fld id="{FFA37F36-A11D-4F16-96EF-CEA0021B2F0A}" type="datetimeFigureOut">
               <a:rPr lang="en-CA" smtClean="0"/>
-              <a:t>2019-11-20</a:t>
+              <a:t>2019-12-10</a:t>
             </a:fld>
             <a:endParaRPr lang="en-CA"/>
           </a:p>
@@ -1831,7 +1831,7 @@
           <a:p>
             <a:fld id="{FFA37F36-A11D-4F16-96EF-CEA0021B2F0A}" type="datetimeFigureOut">
               <a:rPr lang="en-CA" smtClean="0"/>
-              <a:t>2019-11-20</a:t>
+              <a:t>2019-12-10</a:t>
             </a:fld>
             <a:endParaRPr lang="en-CA"/>
           </a:p>
@@ -2454,7 +2454,7 @@
           <a:p>
             <a:fld id="{FFA37F36-A11D-4F16-96EF-CEA0021B2F0A}" type="datetimeFigureOut">
               <a:rPr lang="en-CA" smtClean="0"/>
-              <a:t>2019-11-20</a:t>
+              <a:t>2019-12-10</a:t>
             </a:fld>
             <a:endParaRPr lang="en-CA"/>
           </a:p>
@@ -3314,7 +3314,7 @@
           <a:p>
             <a:fld id="{FFA37F36-A11D-4F16-96EF-CEA0021B2F0A}" type="datetimeFigureOut">
               <a:rPr lang="en-CA" smtClean="0"/>
-              <a:t>2019-11-20</a:t>
+              <a:t>2019-12-10</a:t>
             </a:fld>
             <a:endParaRPr lang="en-CA"/>
           </a:p>
@@ -3484,7 +3484,7 @@
           <a:p>
             <a:fld id="{FFA37F36-A11D-4F16-96EF-CEA0021B2F0A}" type="datetimeFigureOut">
               <a:rPr lang="en-CA" smtClean="0"/>
-              <a:t>2019-11-20</a:t>
+              <a:t>2019-12-10</a:t>
             </a:fld>
             <a:endParaRPr lang="en-CA"/>
           </a:p>
@@ -3664,7 +3664,7 @@
           <a:p>
             <a:fld id="{FFA37F36-A11D-4F16-96EF-CEA0021B2F0A}" type="datetimeFigureOut">
               <a:rPr lang="en-CA" smtClean="0"/>
-              <a:t>2019-11-20</a:t>
+              <a:t>2019-12-10</a:t>
             </a:fld>
             <a:endParaRPr lang="en-CA"/>
           </a:p>
@@ -3834,7 +3834,7 @@
           <a:p>
             <a:fld id="{FFA37F36-A11D-4F16-96EF-CEA0021B2F0A}" type="datetimeFigureOut">
               <a:rPr lang="en-CA" smtClean="0"/>
-              <a:t>2019-11-20</a:t>
+              <a:t>2019-12-10</a:t>
             </a:fld>
             <a:endParaRPr lang="en-CA"/>
           </a:p>
@@ -4081,7 +4081,7 @@
           <a:p>
             <a:fld id="{FFA37F36-A11D-4F16-96EF-CEA0021B2F0A}" type="datetimeFigureOut">
               <a:rPr lang="en-CA" smtClean="0"/>
-              <a:t>2019-11-20</a:t>
+              <a:t>2019-12-10</a:t>
             </a:fld>
             <a:endParaRPr lang="en-CA"/>
           </a:p>
@@ -4373,7 +4373,7 @@
           <a:p>
             <a:fld id="{FFA37F36-A11D-4F16-96EF-CEA0021B2F0A}" type="datetimeFigureOut">
               <a:rPr lang="en-CA" smtClean="0"/>
-              <a:t>2019-11-20</a:t>
+              <a:t>2019-12-10</a:t>
             </a:fld>
             <a:endParaRPr lang="en-CA"/>
           </a:p>
@@ -4817,7 +4817,7 @@
           <a:p>
             <a:fld id="{FFA37F36-A11D-4F16-96EF-CEA0021B2F0A}" type="datetimeFigureOut">
               <a:rPr lang="en-CA" smtClean="0"/>
-              <a:t>2019-11-20</a:t>
+              <a:t>2019-12-10</a:t>
             </a:fld>
             <a:endParaRPr lang="en-CA"/>
           </a:p>
@@ -4935,7 +4935,7 @@
           <a:p>
             <a:fld id="{FFA37F36-A11D-4F16-96EF-CEA0021B2F0A}" type="datetimeFigureOut">
               <a:rPr lang="en-CA" smtClean="0"/>
-              <a:t>2019-11-20</a:t>
+              <a:t>2019-12-10</a:t>
             </a:fld>
             <a:endParaRPr lang="en-CA"/>
           </a:p>
@@ -5030,7 +5030,7 @@
           <a:p>
             <a:fld id="{FFA37F36-A11D-4F16-96EF-CEA0021B2F0A}" type="datetimeFigureOut">
               <a:rPr lang="en-CA" smtClean="0"/>
-              <a:t>2019-11-20</a:t>
+              <a:t>2019-12-10</a:t>
             </a:fld>
             <a:endParaRPr lang="en-CA"/>
           </a:p>
@@ -5309,7 +5309,7 @@
           <a:p>
             <a:fld id="{FFA37F36-A11D-4F16-96EF-CEA0021B2F0A}" type="datetimeFigureOut">
               <a:rPr lang="en-CA" smtClean="0"/>
-              <a:t>2019-11-20</a:t>
+              <a:t>2019-12-10</a:t>
             </a:fld>
             <a:endParaRPr lang="en-CA"/>
           </a:p>
@@ -5584,7 +5584,7 @@
           <a:p>
             <a:fld id="{FFA37F36-A11D-4F16-96EF-CEA0021B2F0A}" type="datetimeFigureOut">
               <a:rPr lang="en-CA" smtClean="0"/>
-              <a:t>2019-11-20</a:t>
+              <a:t>2019-12-10</a:t>
             </a:fld>
             <a:endParaRPr lang="en-CA"/>
           </a:p>
@@ -6013,7 +6013,7 @@
           <a:p>
             <a:fld id="{FFA37F36-A11D-4F16-96EF-CEA0021B2F0A}" type="datetimeFigureOut">
               <a:rPr lang="en-CA" smtClean="0"/>
-              <a:t>2019-11-20</a:t>
+              <a:t>2019-12-10</a:t>
             </a:fld>
             <a:endParaRPr lang="en-CA"/>
           </a:p>
@@ -6865,45 +6865,49 @@
           <a:bodyPr/>
           <a:lstStyle/>
           <a:p>
+            <a:pPr lvl="1"/>
             <a:r>
               <a:rPr lang="en-US" dirty="0"/>
               <a:t>Scalability of the items.</a:t>
             </a:r>
           </a:p>
           <a:p>
+            <a:pPr lvl="1"/>
             <a:r>
               <a:rPr lang="en-US" dirty="0"/>
               <a:t>Data shortage.</a:t>
             </a:r>
           </a:p>
           <a:p>
-            <a:pPr lvl="1"/>
+            <a:pPr lvl="2"/>
             <a:r>
               <a:rPr lang="en-US" dirty="0"/>
               <a:t>Although, It requires much less data compared to a CNN approach.</a:t>
             </a:r>
           </a:p>
           <a:p>
+            <a:pPr lvl="1"/>
             <a:r>
               <a:rPr lang="en-US" dirty="0"/>
               <a:t>Difficulty of distinguishing similar objects without adding other features into the feature vector.</a:t>
             </a:r>
           </a:p>
           <a:p>
+            <a:pPr lvl="1"/>
             <a:r>
               <a:rPr lang="en-US" dirty="0"/>
               <a:t>Difficulty of distinguishing between real and fake objects which could lead to classification errors.</a:t>
             </a:r>
           </a:p>
           <a:p>
-            <a:pPr lvl="1"/>
+            <a:pPr lvl="2"/>
             <a:r>
               <a:rPr lang="en-US" dirty="0"/>
               <a:t>For example, apple vs plastic apple</a:t>
             </a:r>
           </a:p>
           <a:p>
-            <a:pPr lvl="1"/>
+            <a:pPr lvl="2"/>
             <a:r>
               <a:rPr lang="en-US" dirty="0"/>
               <a:t>Possible solution could be to add other measurements such as weight</a:t>

</xml_diff>